<commit_message>
Genus App Services -> Genus Services
</commit_message>
<xml_diff>
--- a/developers/overview/media/architecture.pptx
+++ b/developers/overview/media/architecture.pptx
@@ -104,7 +104,16 @@
       </a:defRPr>
     </a:lvl9pPr>
   </p:defaultTextStyle>
+  <p:extLst>
+    <p:ext uri="{EFAFB233-063F-42B5-8137-9DF3F51BA10A}">
+      <p15:sldGuideLst xmlns:p15="http://schemas.microsoft.com/office/powerpoint/2012/main"/>
+    </p:ext>
+  </p:extLst>
 </p:presentation>
+</file>
+
+<file path=ppt/revisionInfo.xml><?xml version="1.0" encoding="utf-8"?>
+<p1510:revInfo xmlns:a="http://schemas.openxmlformats.org/drawingml/2006/main" xmlns:r="http://schemas.openxmlformats.org/officeDocument/2006/relationships" xmlns:p1510="http://schemas.microsoft.com/office/powerpoint/2015/10/main"/>
 </file>
 
 <file path=ppt/slideLayouts/slideLayout1.xml><?xml version="1.0" encoding="utf-8"?>
@@ -152,7 +161,6 @@
               <a:rPr lang="en-US"/>
               <a:t>Click to edit Master title style</a:t>
             </a:r>
-            <a:endParaRPr lang="en-US"/>
           </a:p>
         </p:txBody>
       </p:sp>
@@ -217,7 +225,6 @@
               <a:rPr lang="en-US"/>
               <a:t>Click to edit Master subtitle style</a:t>
             </a:r>
-            <a:endParaRPr lang="en-US"/>
           </a:p>
         </p:txBody>
       </p:sp>
@@ -238,7 +245,7 @@
           <a:p>
             <a:fld id="{3A7C9C3F-69A9-47A8-B009-858A32894BC2}" type="datetimeFigureOut">
               <a:rPr lang="en-US" smtClean="0"/>
-              <a:t>6/8/2017</a:t>
+              <a:t>10/27/2017</a:t>
             </a:fld>
             <a:endParaRPr lang="en-US"/>
           </a:p>
@@ -335,7 +342,6 @@
               <a:rPr lang="en-US"/>
               <a:t>Click to edit Master title style</a:t>
             </a:r>
-            <a:endParaRPr lang="en-US"/>
           </a:p>
         </p:txBody>
       </p:sp>
@@ -387,7 +393,6 @@
               <a:rPr lang="en-US"/>
               <a:t>Fifth level</a:t>
             </a:r>
-            <a:endParaRPr lang="en-US"/>
           </a:p>
         </p:txBody>
       </p:sp>
@@ -408,7 +413,7 @@
           <a:p>
             <a:fld id="{3A7C9C3F-69A9-47A8-B009-858A32894BC2}" type="datetimeFigureOut">
               <a:rPr lang="en-US" smtClean="0"/>
-              <a:t>6/8/2017</a:t>
+              <a:t>10/27/2017</a:t>
             </a:fld>
             <a:endParaRPr lang="en-US"/>
           </a:p>
@@ -510,7 +515,6 @@
               <a:rPr lang="en-US"/>
               <a:t>Click to edit Master title style</a:t>
             </a:r>
-            <a:endParaRPr lang="en-US"/>
           </a:p>
         </p:txBody>
       </p:sp>
@@ -567,7 +571,6 @@
               <a:rPr lang="en-US"/>
               <a:t>Fifth level</a:t>
             </a:r>
-            <a:endParaRPr lang="en-US"/>
           </a:p>
         </p:txBody>
       </p:sp>
@@ -588,7 +591,7 @@
           <a:p>
             <a:fld id="{3A7C9C3F-69A9-47A8-B009-858A32894BC2}" type="datetimeFigureOut">
               <a:rPr lang="en-US" smtClean="0"/>
-              <a:t>6/8/2017</a:t>
+              <a:t>10/27/2017</a:t>
             </a:fld>
             <a:endParaRPr lang="en-US"/>
           </a:p>
@@ -685,7 +688,6 @@
               <a:rPr lang="en-US"/>
               <a:t>Click to edit Master title style</a:t>
             </a:r>
-            <a:endParaRPr lang="en-US"/>
           </a:p>
         </p:txBody>
       </p:sp>
@@ -737,7 +739,6 @@
               <a:rPr lang="en-US"/>
               <a:t>Fifth level</a:t>
             </a:r>
-            <a:endParaRPr lang="en-US"/>
           </a:p>
         </p:txBody>
       </p:sp>
@@ -758,7 +759,7 @@
           <a:p>
             <a:fld id="{3A7C9C3F-69A9-47A8-B009-858A32894BC2}" type="datetimeFigureOut">
               <a:rPr lang="en-US" smtClean="0"/>
-              <a:t>6/8/2017</a:t>
+              <a:t>10/27/2017</a:t>
             </a:fld>
             <a:endParaRPr lang="en-US"/>
           </a:p>
@@ -864,7 +865,6 @@
               <a:rPr lang="en-US"/>
               <a:t>Click to edit Master title style</a:t>
             </a:r>
-            <a:endParaRPr lang="en-US"/>
           </a:p>
         </p:txBody>
       </p:sp>
@@ -1004,7 +1004,7 @@
           <a:p>
             <a:fld id="{3A7C9C3F-69A9-47A8-B009-858A32894BC2}" type="datetimeFigureOut">
               <a:rPr lang="en-US" smtClean="0"/>
-              <a:t>6/8/2017</a:t>
+              <a:t>10/27/2017</a:t>
             </a:fld>
             <a:endParaRPr lang="en-US"/>
           </a:p>
@@ -1101,7 +1101,6 @@
               <a:rPr lang="en-US"/>
               <a:t>Click to edit Master title style</a:t>
             </a:r>
-            <a:endParaRPr lang="en-US"/>
           </a:p>
         </p:txBody>
       </p:sp>
@@ -1158,7 +1157,6 @@
               <a:rPr lang="en-US"/>
               <a:t>Fifth level</a:t>
             </a:r>
-            <a:endParaRPr lang="en-US"/>
           </a:p>
         </p:txBody>
       </p:sp>
@@ -1215,7 +1213,6 @@
               <a:rPr lang="en-US"/>
               <a:t>Fifth level</a:t>
             </a:r>
-            <a:endParaRPr lang="en-US"/>
           </a:p>
         </p:txBody>
       </p:sp>
@@ -1236,7 +1233,7 @@
           <a:p>
             <a:fld id="{3A7C9C3F-69A9-47A8-B009-858A32894BC2}" type="datetimeFigureOut">
               <a:rPr lang="en-US" smtClean="0"/>
-              <a:t>6/8/2017</a:t>
+              <a:t>10/27/2017</a:t>
             </a:fld>
             <a:endParaRPr lang="en-US"/>
           </a:p>
@@ -1338,7 +1335,6 @@
               <a:rPr lang="en-US"/>
               <a:t>Click to edit Master title style</a:t>
             </a:r>
-            <a:endParaRPr lang="en-US"/>
           </a:p>
         </p:txBody>
       </p:sp>
@@ -1460,7 +1456,6 @@
               <a:rPr lang="en-US"/>
               <a:t>Fifth level</a:t>
             </a:r>
-            <a:endParaRPr lang="en-US"/>
           </a:p>
         </p:txBody>
       </p:sp>
@@ -1582,7 +1577,6 @@
               <a:rPr lang="en-US"/>
               <a:t>Fifth level</a:t>
             </a:r>
-            <a:endParaRPr lang="en-US"/>
           </a:p>
         </p:txBody>
       </p:sp>
@@ -1603,7 +1597,7 @@
           <a:p>
             <a:fld id="{3A7C9C3F-69A9-47A8-B009-858A32894BC2}" type="datetimeFigureOut">
               <a:rPr lang="en-US" smtClean="0"/>
-              <a:t>6/8/2017</a:t>
+              <a:t>10/27/2017</a:t>
             </a:fld>
             <a:endParaRPr lang="en-US"/>
           </a:p>
@@ -1700,7 +1694,6 @@
               <a:rPr lang="en-US"/>
               <a:t>Click to edit Master title style</a:t>
             </a:r>
-            <a:endParaRPr lang="en-US"/>
           </a:p>
         </p:txBody>
       </p:sp>
@@ -1721,7 +1714,7 @@
           <a:p>
             <a:fld id="{3A7C9C3F-69A9-47A8-B009-858A32894BC2}" type="datetimeFigureOut">
               <a:rPr lang="en-US" smtClean="0"/>
-              <a:t>6/8/2017</a:t>
+              <a:t>10/27/2017</a:t>
             </a:fld>
             <a:endParaRPr lang="en-US"/>
           </a:p>
@@ -1816,7 +1809,7 @@
           <a:p>
             <a:fld id="{3A7C9C3F-69A9-47A8-B009-858A32894BC2}" type="datetimeFigureOut">
               <a:rPr lang="en-US" smtClean="0"/>
-              <a:t>6/8/2017</a:t>
+              <a:t>10/27/2017</a:t>
             </a:fld>
             <a:endParaRPr lang="en-US"/>
           </a:p>
@@ -1922,7 +1915,6 @@
               <a:rPr lang="en-US"/>
               <a:t>Click to edit Master title style</a:t>
             </a:r>
-            <a:endParaRPr lang="en-US"/>
           </a:p>
         </p:txBody>
       </p:sp>
@@ -2007,7 +1999,6 @@
               <a:rPr lang="en-US"/>
               <a:t>Fifth level</a:t>
             </a:r>
-            <a:endParaRPr lang="en-US"/>
           </a:p>
         </p:txBody>
       </p:sp>
@@ -2093,7 +2084,7 @@
           <a:p>
             <a:fld id="{3A7C9C3F-69A9-47A8-B009-858A32894BC2}" type="datetimeFigureOut">
               <a:rPr lang="en-US" smtClean="0"/>
-              <a:t>6/8/2017</a:t>
+              <a:t>10/27/2017</a:t>
             </a:fld>
             <a:endParaRPr lang="en-US"/>
           </a:p>
@@ -2199,7 +2190,6 @@
               <a:rPr lang="en-US"/>
               <a:t>Click to edit Master title style</a:t>
             </a:r>
-            <a:endParaRPr lang="en-US"/>
           </a:p>
         </p:txBody>
       </p:sp>
@@ -2346,7 +2336,7 @@
           <a:p>
             <a:fld id="{3A7C9C3F-69A9-47A8-B009-858A32894BC2}" type="datetimeFigureOut">
               <a:rPr lang="en-US" smtClean="0"/>
-              <a:t>6/8/2017</a:t>
+              <a:t>10/27/2017</a:t>
             </a:fld>
             <a:endParaRPr lang="en-US"/>
           </a:p>
@@ -2458,7 +2448,6 @@
               <a:rPr lang="en-US"/>
               <a:t>Click to edit Master title style</a:t>
             </a:r>
-            <a:endParaRPr lang="en-US"/>
           </a:p>
         </p:txBody>
       </p:sp>
@@ -2520,7 +2509,6 @@
               <a:rPr lang="en-US"/>
               <a:t>Fifth level</a:t>
             </a:r>
-            <a:endParaRPr lang="en-US"/>
           </a:p>
         </p:txBody>
       </p:sp>
@@ -2559,7 +2547,7 @@
           <a:p>
             <a:fld id="{3A7C9C3F-69A9-47A8-B009-858A32894BC2}" type="datetimeFigureOut">
               <a:rPr lang="en-US" smtClean="0"/>
-              <a:t>6/8/2017</a:t>
+              <a:t>10/27/2017</a:t>
             </a:fld>
             <a:endParaRPr lang="en-US"/>
           </a:p>
@@ -2966,75 +2954,6 @@
       </p:grpSpPr>
       <p:sp>
         <p:nvSpPr>
-          <p:cNvPr id="4" name="Rounded Rectangle 42"/>
-          <p:cNvSpPr/>
-          <p:nvPr/>
-        </p:nvSpPr>
-        <p:spPr bwMode="auto">
-          <a:xfrm>
-            <a:off x="4494587" y="3229946"/>
-            <a:ext cx="1759240" cy="522657"/>
-          </a:xfrm>
-          <a:prstGeom prst="roundRect">
-            <a:avLst/>
-          </a:prstGeom>
-          <a:noFill/>
-          <a:ln w="28575">
-            <a:solidFill>
-              <a:schemeClr val="tx1"/>
-            </a:solidFill>
-            <a:headEnd type="none" w="med" len="med"/>
-            <a:tailEnd type="none" w="med" len="med"/>
-          </a:ln>
-          <a:effectLst/>
-        </p:spPr>
-        <p:style>
-          <a:lnRef idx="1">
-            <a:schemeClr val="accent2"/>
-          </a:lnRef>
-          <a:fillRef idx="3">
-            <a:schemeClr val="accent2"/>
-          </a:fillRef>
-          <a:effectRef idx="2">
-            <a:schemeClr val="accent2"/>
-          </a:effectRef>
-          <a:fontRef idx="minor">
-            <a:schemeClr val="lt1"/>
-          </a:fontRef>
-        </p:style>
-        <p:txBody>
-          <a:bodyPr rot="0" spcFirstLastPara="0" vert="horz" wrap="square" lIns="182880" tIns="146304" rIns="182880" bIns="146304" numCol="1" spcCol="0" rtlCol="0" fromWordArt="0" anchor="b" anchorCtr="0" forceAA="0" compatLnSpc="1">
-            <a:prstTxWarp prst="textNoShape">
-              <a:avLst/>
-            </a:prstTxWarp>
-            <a:noAutofit/>
-          </a:bodyPr>
-          <a:lstStyle/>
-          <a:p>
-            <a:pPr algn="ctr" defTabSz="932472" fontAlgn="base">
-              <a:lnSpc>
-                <a:spcPct val="90000"/>
-              </a:lnSpc>
-              <a:spcBef>
-                <a:spcPct val="0"/>
-              </a:spcBef>
-              <a:spcAft>
-                <a:spcPct val="0"/>
-              </a:spcAft>
-            </a:pPr>
-            <a:endParaRPr lang="en-US" sz="1200" dirty="0">
-              <a:solidFill>
-                <a:schemeClr val="tx1"/>
-              </a:solidFill>
-              <a:latin typeface="Segoe UI"/>
-              <a:ea typeface="Segoe UI" pitchFamily="34" charset="0"/>
-              <a:cs typeface="Segoe UI" pitchFamily="34" charset="0"/>
-            </a:endParaRPr>
-          </a:p>
-        </p:txBody>
-      </p:sp>
-      <p:sp>
-        <p:nvSpPr>
           <p:cNvPr id="5" name="Flowchart: Magnetic Disk 4"/>
           <p:cNvSpPr/>
           <p:nvPr/>
@@ -3216,7 +3135,7 @@
         </p:nvCxnSpPr>
         <p:spPr>
           <a:xfrm flipH="1" flipV="1">
-            <a:off x="5024195" y="2872759"/>
+            <a:off x="5198458" y="2862578"/>
             <a:ext cx="919" cy="226725"/>
           </a:xfrm>
           <a:prstGeom prst="line">
@@ -3344,7 +3263,7 @@
         </p:nvCxnSpPr>
         <p:spPr>
           <a:xfrm flipH="1" flipV="1">
-            <a:off x="7660081" y="2886535"/>
+            <a:off x="7399551" y="2870100"/>
             <a:ext cx="919" cy="226725"/>
           </a:xfrm>
           <a:prstGeom prst="line">
@@ -3422,8 +3341,8 @@
         </p:nvSpPr>
         <p:spPr bwMode="auto">
           <a:xfrm>
-            <a:off x="4368868" y="2138635"/>
-            <a:ext cx="1163011" cy="583301"/>
+            <a:off x="4183092" y="2138635"/>
+            <a:ext cx="1370061" cy="583301"/>
           </a:xfrm>
           <a:prstGeom prst="roundRect">
             <a:avLst/>
@@ -3491,7 +3410,7 @@
         </p:nvSpPr>
         <p:spPr>
           <a:xfrm>
-            <a:off x="4843670" y="2240910"/>
+            <a:off x="4657894" y="2240910"/>
             <a:ext cx="618951" cy="424732"/>
           </a:xfrm>
           <a:prstGeom prst="rect">
@@ -3573,14 +3492,14 @@
       </p:sp>
       <p:sp>
         <p:nvSpPr>
-          <p:cNvPr id="13" name="Rounded Rectangle 52"/>
+          <p:cNvPr id="15" name="Rounded Rectangle 55"/>
           <p:cNvSpPr/>
           <p:nvPr/>
         </p:nvSpPr>
         <p:spPr bwMode="auto">
           <a:xfrm>
-            <a:off x="5729839" y="2138637"/>
-            <a:ext cx="1161046" cy="583300"/>
+            <a:off x="5668189" y="2138635"/>
+            <a:ext cx="1366192" cy="583301"/>
           </a:xfrm>
           <a:prstGeom prst="roundRect">
             <a:avLst/>
@@ -3642,14 +3561,14 @@
       </p:sp>
       <p:sp>
         <p:nvSpPr>
-          <p:cNvPr id="14" name="Rectangle 13"/>
+          <p:cNvPr id="16" name="Rectangle 15"/>
           <p:cNvSpPr/>
           <p:nvPr/>
         </p:nvSpPr>
         <p:spPr>
           <a:xfrm>
-            <a:off x="6127404" y="2237316"/>
-            <a:ext cx="744884" cy="424732"/>
+            <a:off x="6019960" y="2251523"/>
+            <a:ext cx="995785" cy="424732"/>
           </a:xfrm>
           <a:prstGeom prst="rect">
             <a:avLst/>
@@ -3690,7 +3609,7 @@
                 <a:ea typeface="Segoe UI" pitchFamily="34" charset="0"/>
                 <a:cs typeface="Segoe UI" pitchFamily="34" charset="0"/>
               </a:rPr>
-              <a:t>Genus</a:t>
+              <a:t>Genus Apps</a:t>
             </a:r>
           </a:p>
           <a:p>
@@ -3712,176 +3631,24 @@
               <a:defRPr/>
             </a:pPr>
             <a:r>
-              <a:rPr kumimoji="0" lang="en-US" sz="1200" b="0" i="0" u="none" strike="noStrike" kern="1200" cap="none" spc="0" normalizeH="0" baseline="0" noProof="0" dirty="0">
-                <a:ln>
-                  <a:noFill/>
-                </a:ln>
-                <a:effectLst/>
-                <a:uLnTx/>
-                <a:uFillTx/>
+              <a:rPr lang="en-US" sz="1200" dirty="0">
                 <a:latin typeface="Segoe UI"/>
                 <a:ea typeface="Segoe UI" pitchFamily="34" charset="0"/>
                 <a:cs typeface="Segoe UI" pitchFamily="34" charset="0"/>
               </a:rPr>
-              <a:t>Desktop</a:t>
-            </a:r>
-          </a:p>
-        </p:txBody>
-      </p:sp>
-      <p:sp>
-        <p:nvSpPr>
-          <p:cNvPr id="15" name="Rounded Rectangle 55"/>
-          <p:cNvSpPr/>
-          <p:nvPr/>
-        </p:nvSpPr>
-        <p:spPr bwMode="auto">
-          <a:xfrm>
-            <a:off x="7116981" y="2138635"/>
-            <a:ext cx="1159727" cy="583301"/>
-          </a:xfrm>
-          <a:prstGeom prst="roundRect">
-            <a:avLst/>
-          </a:prstGeom>
-          <a:noFill/>
-          <a:ln w="38100">
-            <a:solidFill>
-              <a:schemeClr val="tx1"/>
-            </a:solidFill>
-            <a:headEnd type="none" w="med" len="med"/>
-            <a:tailEnd type="none" w="med" len="med"/>
-          </a:ln>
-          <a:effectLst/>
-        </p:spPr>
-        <p:style>
-          <a:lnRef idx="1">
-            <a:schemeClr val="accent2"/>
-          </a:lnRef>
-          <a:fillRef idx="3">
-            <a:schemeClr val="accent2"/>
-          </a:fillRef>
-          <a:effectRef idx="2">
-            <a:schemeClr val="accent2"/>
-          </a:effectRef>
-          <a:fontRef idx="minor">
-            <a:schemeClr val="lt1"/>
-          </a:fontRef>
-        </p:style>
-        <p:txBody>
-          <a:bodyPr rot="0" spcFirstLastPara="0" vert="horz" wrap="square" lIns="182880" tIns="146304" rIns="182880" bIns="146304" numCol="1" spcCol="0" rtlCol="0" fromWordArt="0" anchor="ctr" anchorCtr="0" forceAA="0" compatLnSpc="1">
-            <a:prstTxWarp prst="textNoShape">
-              <a:avLst/>
-            </a:prstTxWarp>
-            <a:noAutofit/>
-          </a:bodyPr>
-          <a:lstStyle/>
-          <a:p>
-            <a:pPr algn="ctr" defTabSz="932472" fontAlgn="base">
-              <a:lnSpc>
-                <a:spcPct val="90000"/>
-              </a:lnSpc>
-              <a:spcBef>
-                <a:spcPct val="0"/>
-              </a:spcBef>
-              <a:spcAft>
-                <a:spcPct val="0"/>
-              </a:spcAft>
-            </a:pPr>
-            <a:endParaRPr lang="en-US" sz="1000" dirty="0">
-              <a:solidFill>
-                <a:schemeClr val="tx1"/>
-              </a:solidFill>
+              <a:t>for Web</a:t>
+            </a:r>
+            <a:endParaRPr kumimoji="0" lang="en-US" sz="1200" b="0" i="0" u="none" strike="noStrike" kern="1200" cap="none" spc="0" normalizeH="0" baseline="0" noProof="0" dirty="0">
+              <a:ln>
+                <a:noFill/>
+              </a:ln>
+              <a:effectLst/>
+              <a:uLnTx/>
+              <a:uFillTx/>
               <a:latin typeface="Segoe UI"/>
               <a:ea typeface="Segoe UI" pitchFamily="34" charset="0"/>
               <a:cs typeface="Segoe UI" pitchFamily="34" charset="0"/>
             </a:endParaRPr>
-          </a:p>
-        </p:txBody>
-      </p:sp>
-      <p:sp>
-        <p:nvSpPr>
-          <p:cNvPr id="16" name="Rectangle 15"/>
-          <p:cNvSpPr/>
-          <p:nvPr/>
-        </p:nvSpPr>
-        <p:spPr>
-          <a:xfrm>
-            <a:off x="7600441" y="2251523"/>
-            <a:ext cx="609462" cy="424732"/>
-          </a:xfrm>
-          <a:prstGeom prst="rect">
-            <a:avLst/>
-          </a:prstGeom>
-        </p:spPr>
-        <p:txBody>
-          <a:bodyPr wrap="none">
-            <a:spAutoFit/>
-          </a:bodyPr>
-          <a:lstStyle/>
-          <a:p>
-            <a:pPr marL="0" marR="0" lvl="0" indent="0" algn="ctr" defTabSz="932472" rtl="0" eaLnBrk="1" fontAlgn="base" latinLnBrk="0" hangingPunct="1">
-              <a:lnSpc>
-                <a:spcPct val="90000"/>
-              </a:lnSpc>
-              <a:spcBef>
-                <a:spcPct val="0"/>
-              </a:spcBef>
-              <a:spcAft>
-                <a:spcPct val="0"/>
-              </a:spcAft>
-              <a:buClrTx/>
-              <a:buSzTx/>
-              <a:buFontTx/>
-              <a:buNone/>
-              <a:tabLst/>
-              <a:defRPr/>
-            </a:pPr>
-            <a:r>
-              <a:rPr kumimoji="0" lang="en-US" sz="1200" b="0" i="0" u="none" strike="noStrike" kern="1200" cap="none" spc="0" normalizeH="0" baseline="0" noProof="0" dirty="0">
-                <a:ln>
-                  <a:noFill/>
-                </a:ln>
-                <a:effectLst/>
-                <a:uLnTx/>
-                <a:uFillTx/>
-                <a:latin typeface="Segoe UI"/>
-                <a:ea typeface="Segoe UI" pitchFamily="34" charset="0"/>
-                <a:cs typeface="Segoe UI" pitchFamily="34" charset="0"/>
-              </a:rPr>
-              <a:t>Genus</a:t>
-            </a:r>
-          </a:p>
-          <a:p>
-            <a:pPr marL="0" marR="0" lvl="0" indent="0" algn="ctr" defTabSz="932472" rtl="0" eaLnBrk="1" fontAlgn="base" latinLnBrk="0" hangingPunct="1">
-              <a:lnSpc>
-                <a:spcPct val="90000"/>
-              </a:lnSpc>
-              <a:spcBef>
-                <a:spcPct val="0"/>
-              </a:spcBef>
-              <a:spcAft>
-                <a:spcPct val="0"/>
-              </a:spcAft>
-              <a:buClrTx/>
-              <a:buSzTx/>
-              <a:buFontTx/>
-              <a:buNone/>
-              <a:tabLst/>
-              <a:defRPr/>
-            </a:pPr>
-            <a:r>
-              <a:rPr kumimoji="0" lang="en-US" sz="1200" b="0" i="0" u="none" strike="noStrike" kern="1200" cap="none" spc="0" normalizeH="0" baseline="0" noProof="0" dirty="0">
-                <a:ln>
-                  <a:noFill/>
-                </a:ln>
-                <a:effectLst/>
-                <a:uLnTx/>
-                <a:uFillTx/>
-                <a:latin typeface="Segoe UI"/>
-                <a:ea typeface="Segoe UI" pitchFamily="34" charset="0"/>
-                <a:cs typeface="Segoe UI" pitchFamily="34" charset="0"/>
-              </a:rPr>
-              <a:t>Apps</a:t>
-            </a:r>
           </a:p>
         </p:txBody>
       </p:sp>
@@ -3926,7 +3693,7 @@
       </p:cxnSp>
       <p:pic>
         <p:nvPicPr>
-          <p:cNvPr id="18" name="Picture 395"/>
+          <p:cNvPr id="19" name="Picture 153"/>
           <p:cNvPicPr>
             <a:picLocks noChangeAspect="1"/>
           </p:cNvPicPr>
@@ -3956,70 +3723,7 @@
         </p:blipFill>
         <p:spPr bwMode="auto">
           <a:xfrm>
-            <a:off x="5857178" y="2320652"/>
-            <a:ext cx="256789" cy="256824"/>
-          </a:xfrm>
-          <a:prstGeom prst="rect">
-            <a:avLst/>
-          </a:prstGeom>
-          <a:noFill/>
-          <a:ln>
-            <a:noFill/>
-          </a:ln>
-          <a:extLst>
-            <a:ext uri="{909E8E84-426E-40DD-AFC4-6F175D3DCCD1}">
-              <a14:hiddenFill xmlns:a14="http://schemas.microsoft.com/office/drawing/2010/main">
-                <a:solidFill>
-                  <a:srgbClr val="FFFFFF"/>
-                </a:solidFill>
-              </a14:hiddenFill>
-            </a:ext>
-            <a:ext uri="{91240B29-F687-4F45-9708-019B960494DF}">
-              <a14:hiddenLine xmlns:a14="http://schemas.microsoft.com/office/drawing/2010/main" w="9525">
-                <a:solidFill>
-                  <a:srgbClr val="000000"/>
-                </a:solidFill>
-                <a:miter lim="800000"/>
-                <a:headEnd/>
-                <a:tailEnd/>
-              </a14:hiddenLine>
-            </a:ext>
-          </a:extLst>
-        </p:spPr>
-      </p:pic>
-      <p:pic>
-        <p:nvPicPr>
-          <p:cNvPr id="19" name="Picture 153"/>
-          <p:cNvPicPr>
-            <a:picLocks noChangeAspect="1"/>
-          </p:cNvPicPr>
-          <p:nvPr/>
-        </p:nvPicPr>
-        <p:blipFill>
-          <a:blip r:embed="rId4" cstate="print">
-            <a:extLst>
-              <a:ext uri="{BEBA8EAE-BF5A-486C-A8C5-ECC9F3942E4B}">
-                <a14:imgProps xmlns:a14="http://schemas.microsoft.com/office/drawing/2010/main">
-                  <a14:imgLayer r:embed="rId5">
-                    <a14:imgEffect>
-                      <a14:saturation sat="0"/>
-                    </a14:imgEffect>
-                  </a14:imgLayer>
-                </a14:imgProps>
-              </a:ext>
-              <a:ext uri="{28A0092B-C50C-407E-A947-70E740481C1C}">
-                <a14:useLocalDpi xmlns:a14="http://schemas.microsoft.com/office/drawing/2010/main" val="0"/>
-              </a:ext>
-            </a:extLst>
-          </a:blip>
-          <a:srcRect/>
-          <a:stretch>
-            <a:fillRect/>
-          </a:stretch>
-        </p:blipFill>
-        <p:spPr bwMode="auto">
-          <a:xfrm>
-            <a:off x="7243553" y="2298094"/>
+            <a:off x="5794761" y="2298094"/>
             <a:ext cx="285353" cy="285506"/>
           </a:xfrm>
           <a:prstGeom prst="rect">
@@ -4059,7 +3763,7 @@
           <p:nvPr/>
         </p:nvPicPr>
         <p:blipFill>
-          <a:blip r:embed="rId6" cstate="print">
+          <a:blip r:embed="rId4" cstate="print">
             <a:extLst>
               <a:ext uri="{28A0092B-C50C-407E-A947-70E740481C1C}">
                 <a14:useLocalDpi xmlns:a14="http://schemas.microsoft.com/office/drawing/2010/main" val="0"/>
@@ -4072,7 +3776,7 @@
         </p:blipFill>
         <p:spPr>
           <a:xfrm>
-            <a:off x="4543255" y="2299048"/>
+            <a:off x="4357479" y="2299048"/>
             <a:ext cx="278428" cy="278428"/>
           </a:xfrm>
           <a:prstGeom prst="rect">
@@ -4088,8 +3792,8 @@
         </p:nvSpPr>
         <p:spPr bwMode="auto">
           <a:xfrm>
-            <a:off x="6349164" y="3229945"/>
-            <a:ext cx="1759240" cy="522657"/>
+            <a:off x="5024195" y="3229945"/>
+            <a:ext cx="2582998" cy="522657"/>
           </a:xfrm>
           <a:prstGeom prst="roundRect">
             <a:avLst/>
@@ -4151,14 +3855,14 @@
       </p:sp>
       <p:pic>
         <p:nvPicPr>
-          <p:cNvPr id="22" name="Picture 21" descr="Hybrid Connections (BizTalk).png"/>
+          <p:cNvPr id="24" name="Picture 23" descr="Hybrid Connections (BizTalk).png"/>
           <p:cNvPicPr>
             <a:picLocks noChangeAspect="1"/>
           </p:cNvPicPr>
           <p:nvPr/>
         </p:nvPicPr>
         <p:blipFill>
-          <a:blip r:embed="rId7" cstate="print">
+          <a:blip r:embed="rId5" cstate="print">
             <a:grayscl/>
             <a:extLst>
               <a:ext uri="{28A0092B-C50C-407E-A947-70E740481C1C}">
@@ -4173,7 +3877,7 @@
         </p:blipFill>
         <p:spPr bwMode="auto">
           <a:xfrm>
-            <a:off x="4690254" y="3350136"/>
+            <a:off x="5199377" y="3350136"/>
             <a:ext cx="288576" cy="288887"/>
           </a:xfrm>
           <a:prstGeom prst="rect">
@@ -4206,14 +3910,14 @@
       </p:pic>
       <p:sp>
         <p:nvSpPr>
-          <p:cNvPr id="23" name="Rectangle 22"/>
+          <p:cNvPr id="25" name="Rectangle 24"/>
           <p:cNvSpPr/>
           <p:nvPr/>
         </p:nvSpPr>
         <p:spPr>
           <a:xfrm>
-            <a:off x="5074167" y="3282214"/>
-            <a:ext cx="1053237" cy="424732"/>
+            <a:off x="5736563" y="3362007"/>
+            <a:ext cx="1199111" cy="258532"/>
           </a:xfrm>
           <a:prstGeom prst="rect">
             <a:avLst/>
@@ -4242,9 +3946,63 @@
                 <a:ea typeface="Segoe UI" pitchFamily="34" charset="0"/>
                 <a:cs typeface="Segoe UI" pitchFamily="34" charset="0"/>
               </a:rPr>
-              <a:t>Genus</a:t>
-            </a:r>
-          </a:p>
+              <a:t>Genus Services</a:t>
+            </a:r>
+          </a:p>
+        </p:txBody>
+      </p:sp>
+      <p:sp>
+        <p:nvSpPr>
+          <p:cNvPr id="26" name="Rounded Rectangle 52">
+            <a:extLst>
+              <a:ext uri="{FF2B5EF4-FFF2-40B4-BE49-F238E27FC236}">
+                <a16:creationId xmlns:a16="http://schemas.microsoft.com/office/drawing/2014/main" id="{059EA088-C88C-4FCC-B332-96DE46F26149}"/>
+              </a:ext>
+            </a:extLst>
+          </p:cNvPr>
+          <p:cNvSpPr/>
+          <p:nvPr/>
+        </p:nvSpPr>
+        <p:spPr bwMode="auto">
+          <a:xfrm>
+            <a:off x="7144737" y="2143939"/>
+            <a:ext cx="1367746" cy="583300"/>
+          </a:xfrm>
+          <a:prstGeom prst="roundRect">
+            <a:avLst/>
+          </a:prstGeom>
+          <a:noFill/>
+          <a:ln w="38100">
+            <a:solidFill>
+              <a:schemeClr val="tx1"/>
+            </a:solidFill>
+            <a:headEnd type="none" w="med" len="med"/>
+            <a:tailEnd type="none" w="med" len="med"/>
+          </a:ln>
+          <a:effectLst/>
+        </p:spPr>
+        <p:style>
+          <a:lnRef idx="1">
+            <a:schemeClr val="accent2"/>
+          </a:lnRef>
+          <a:fillRef idx="3">
+            <a:schemeClr val="accent2"/>
+          </a:fillRef>
+          <a:effectRef idx="2">
+            <a:schemeClr val="accent2"/>
+          </a:effectRef>
+          <a:fontRef idx="minor">
+            <a:schemeClr val="lt1"/>
+          </a:fontRef>
+        </p:style>
+        <p:txBody>
+          <a:bodyPr rot="0" spcFirstLastPara="0" vert="horz" wrap="square" lIns="182880" tIns="146304" rIns="182880" bIns="146304" numCol="1" spcCol="0" rtlCol="0" fromWordArt="0" anchor="ctr" anchorCtr="0" forceAA="0" compatLnSpc="1">
+            <a:prstTxWarp prst="textNoShape">
+              <a:avLst/>
+            </a:prstTxWarp>
+            <a:noAutofit/>
+          </a:bodyPr>
+          <a:lstStyle/>
           <a:p>
             <a:pPr algn="ctr" defTabSz="932472" fontAlgn="base">
               <a:lnSpc>
@@ -4257,29 +4015,137 @@
                 <a:spcPct val="0"/>
               </a:spcAft>
             </a:pPr>
-            <a:r>
-              <a:rPr lang="en-US" sz="1200" dirty="0">
+            <a:endParaRPr lang="en-US" sz="1000" dirty="0">
+              <a:solidFill>
+                <a:schemeClr val="tx1"/>
+              </a:solidFill>
+              <a:latin typeface="Segoe UI"/>
+              <a:ea typeface="Segoe UI" pitchFamily="34" charset="0"/>
+              <a:cs typeface="Segoe UI" pitchFamily="34" charset="0"/>
+            </a:endParaRPr>
+          </a:p>
+        </p:txBody>
+      </p:sp>
+      <p:sp>
+        <p:nvSpPr>
+          <p:cNvPr id="27" name="Rectangle 26">
+            <a:extLst>
+              <a:ext uri="{FF2B5EF4-FFF2-40B4-BE49-F238E27FC236}">
+                <a16:creationId xmlns:a16="http://schemas.microsoft.com/office/drawing/2014/main" id="{A002758D-049E-4C72-B0EC-AD27B960ECEA}"/>
+              </a:ext>
+            </a:extLst>
+          </p:cNvPr>
+          <p:cNvSpPr/>
+          <p:nvPr/>
+        </p:nvSpPr>
+        <p:spPr>
+          <a:xfrm>
+            <a:off x="7478324" y="2242618"/>
+            <a:ext cx="995785" cy="424732"/>
+          </a:xfrm>
+          <a:prstGeom prst="rect">
+            <a:avLst/>
+          </a:prstGeom>
+        </p:spPr>
+        <p:txBody>
+          <a:bodyPr wrap="none">
+            <a:spAutoFit/>
+          </a:bodyPr>
+          <a:lstStyle/>
+          <a:p>
+            <a:pPr marL="0" marR="0" lvl="0" indent="0" algn="ctr" defTabSz="932472" rtl="0" eaLnBrk="1" fontAlgn="base" latinLnBrk="0" hangingPunct="1">
+              <a:lnSpc>
+                <a:spcPct val="90000"/>
+              </a:lnSpc>
+              <a:spcBef>
+                <a:spcPct val="0"/>
+              </a:spcBef>
+              <a:spcAft>
+                <a:spcPct val="0"/>
+              </a:spcAft>
+              <a:buClrTx/>
+              <a:buSzTx/>
+              <a:buFontTx/>
+              <a:buNone/>
+              <a:tabLst/>
+              <a:defRPr/>
+            </a:pPr>
+            <a:r>
+              <a:rPr kumimoji="0" lang="en-US" sz="1200" b="0" i="0" u="none" strike="noStrike" kern="1200" cap="none" spc="0" normalizeH="0" baseline="0" noProof="0" dirty="0">
+                <a:ln>
+                  <a:noFill/>
+                </a:ln>
+                <a:effectLst/>
+                <a:uLnTx/>
+                <a:uFillTx/>
                 <a:latin typeface="Segoe UI"/>
                 <a:ea typeface="Segoe UI" pitchFamily="34" charset="0"/>
                 <a:cs typeface="Segoe UI" pitchFamily="34" charset="0"/>
               </a:rPr>
-              <a:t>App Services</a:t>
+              <a:t>Genus Apps</a:t>
+            </a:r>
+          </a:p>
+          <a:p>
+            <a:pPr marL="0" marR="0" lvl="0" indent="0" algn="ctr" defTabSz="932472" rtl="0" eaLnBrk="1" fontAlgn="base" latinLnBrk="0" hangingPunct="1">
+              <a:lnSpc>
+                <a:spcPct val="90000"/>
+              </a:lnSpc>
+              <a:spcBef>
+                <a:spcPct val="0"/>
+              </a:spcBef>
+              <a:spcAft>
+                <a:spcPct val="0"/>
+              </a:spcAft>
+              <a:buClrTx/>
+              <a:buSzTx/>
+              <a:buFontTx/>
+              <a:buNone/>
+              <a:tabLst/>
+              <a:defRPr/>
+            </a:pPr>
+            <a:r>
+              <a:rPr kumimoji="0" lang="en-US" sz="1200" b="0" i="0" u="none" strike="noStrike" kern="1200" cap="none" spc="0" normalizeH="0" baseline="0" noProof="0" dirty="0">
+                <a:ln>
+                  <a:noFill/>
+                </a:ln>
+                <a:effectLst/>
+                <a:uLnTx/>
+                <a:uFillTx/>
+                <a:latin typeface="Segoe UI"/>
+                <a:ea typeface="Segoe UI" pitchFamily="34" charset="0"/>
+                <a:cs typeface="Segoe UI" pitchFamily="34" charset="0"/>
+              </a:rPr>
+              <a:t>for Desktop</a:t>
             </a:r>
           </a:p>
         </p:txBody>
       </p:sp>
       <p:pic>
         <p:nvPicPr>
-          <p:cNvPr id="24" name="Picture 23" descr="Hybrid Connections (BizTalk).png"/>
+          <p:cNvPr id="28" name="Picture 395">
+            <a:extLst>
+              <a:ext uri="{FF2B5EF4-FFF2-40B4-BE49-F238E27FC236}">
+                <a16:creationId xmlns:a16="http://schemas.microsoft.com/office/drawing/2014/main" id="{CA71B01A-9E88-4B26-A98E-0B4E02E1D1E3}"/>
+              </a:ext>
+            </a:extLst>
+          </p:cNvPr>
           <p:cNvPicPr>
             <a:picLocks noChangeAspect="1"/>
           </p:cNvPicPr>
           <p:nvPr/>
         </p:nvPicPr>
         <p:blipFill>
-          <a:blip r:embed="rId7" cstate="print">
-            <a:grayscl/>
+          <a:blip r:embed="rId6" cstate="print">
             <a:extLst>
+              <a:ext uri="{BEBA8EAE-BF5A-486C-A8C5-ECC9F3942E4B}">
+                <a14:imgProps xmlns:a14="http://schemas.microsoft.com/office/drawing/2010/main">
+                  <a14:imgLayer r:embed="rId7">
+                    <a14:imgEffect>
+                      <a14:saturation sat="0"/>
+                    </a14:imgEffect>
+                  </a14:imgLayer>
+                </a14:imgProps>
+              </a:ext>
               <a:ext uri="{28A0092B-C50C-407E-A947-70E740481C1C}">
                 <a14:useLocalDpi xmlns:a14="http://schemas.microsoft.com/office/drawing/2010/main" val="0"/>
               </a:ext>
@@ -4292,8 +4158,8 @@
         </p:blipFill>
         <p:spPr bwMode="auto">
           <a:xfrm>
-            <a:off x="6551761" y="3350136"/>
-            <a:ext cx="288576" cy="288887"/>
+            <a:off x="7272076" y="2325954"/>
+            <a:ext cx="256789" cy="256824"/>
           </a:xfrm>
           <a:prstGeom prst="rect">
             <a:avLst/>
@@ -4323,70 +4189,6 @@
           </a:extLst>
         </p:spPr>
       </p:pic>
-      <p:sp>
-        <p:nvSpPr>
-          <p:cNvPr id="25" name="Rectangle 24"/>
-          <p:cNvSpPr/>
-          <p:nvPr/>
-        </p:nvSpPr>
-        <p:spPr>
-          <a:xfrm>
-            <a:off x="6935674" y="3282214"/>
-            <a:ext cx="1053237" cy="424732"/>
-          </a:xfrm>
-          <a:prstGeom prst="rect">
-            <a:avLst/>
-          </a:prstGeom>
-        </p:spPr>
-        <p:txBody>
-          <a:bodyPr wrap="none">
-            <a:spAutoFit/>
-          </a:bodyPr>
-          <a:lstStyle/>
-          <a:p>
-            <a:pPr algn="ctr" defTabSz="932472" fontAlgn="base">
-              <a:lnSpc>
-                <a:spcPct val="90000"/>
-              </a:lnSpc>
-              <a:spcBef>
-                <a:spcPct val="0"/>
-              </a:spcBef>
-              <a:spcAft>
-                <a:spcPct val="0"/>
-              </a:spcAft>
-            </a:pPr>
-            <a:r>
-              <a:rPr lang="en-US" sz="1200" dirty="0">
-                <a:latin typeface="Segoe UI"/>
-                <a:ea typeface="Segoe UI" pitchFamily="34" charset="0"/>
-                <a:cs typeface="Segoe UI" pitchFamily="34" charset="0"/>
-              </a:rPr>
-              <a:t>Genus</a:t>
-            </a:r>
-          </a:p>
-          <a:p>
-            <a:pPr algn="ctr" defTabSz="932472" fontAlgn="base">
-              <a:lnSpc>
-                <a:spcPct val="90000"/>
-              </a:lnSpc>
-              <a:spcBef>
-                <a:spcPct val="0"/>
-              </a:spcBef>
-              <a:spcAft>
-                <a:spcPct val="0"/>
-              </a:spcAft>
-            </a:pPr>
-            <a:r>
-              <a:rPr lang="en-US" sz="1200" dirty="0">
-                <a:latin typeface="Segoe UI"/>
-                <a:ea typeface="Segoe UI" pitchFamily="34" charset="0"/>
-                <a:cs typeface="Segoe UI" pitchFamily="34" charset="0"/>
-              </a:rPr>
-              <a:t>App Services</a:t>
-            </a:r>
-          </a:p>
-        </p:txBody>
-      </p:sp>
     </p:spTree>
     <p:extLst>
       <p:ext uri="{BB962C8B-B14F-4D97-AF65-F5344CB8AC3E}">

</xml_diff>